<commit_message>
updated events in questionnaire.py, created randomize_events.py
</commit_message>
<xml_diff>
--- a/documents/participant_event_list1.pptx
+++ b/documents/participant_event_list1.pptx
@@ -105,6 +105,11 @@
       </a:defRPr>
     </a:lvl9pPr>
   </p:defaultTextStyle>
+  <p:extLst>
+    <p:ext uri="{EFAFB233-063F-42B5-8137-9DF3F51BA10A}">
+      <p15:sldGuideLst xmlns:p15="http://schemas.microsoft.com/office/powerpoint/2012/main"/>
+    </p:ext>
+  </p:extLst>
 </p:presentation>
 </file>
 
@@ -3588,7 +3593,7 @@
             <a:pPr algn="ctr"/>
             <a:r>
               <a:rPr lang="fr-FR" sz="1400" dirty="0" smtClean="0"/>
-              <a:t>Été 2019</a:t>
+              <a:t>Fin 2019</a:t>
             </a:r>
           </a:p>
           <a:p>
@@ -3664,15 +3669,44 @@
             <a:pPr algn="ctr"/>
             <a:r>
               <a:rPr lang="fr-FR" sz="1400" dirty="0" smtClean="0"/>
-              <a:t>Vous trouverez ici la liste des événements à apprendre pour l’expérience.</a:t>
-            </a:r>
-          </a:p>
-          <a:p>
-            <a:pPr algn="ctr"/>
+              <a:t>Vous trouverez ici la liste des événements à </a:t>
+            </a:r>
+            <a:r>
+              <a:rPr lang="fr-FR" sz="1400" dirty="0" smtClean="0"/>
+              <a:t>étudier</a:t>
+            </a:r>
+            <a:r>
+              <a:rPr lang="fr-FR" sz="1400" dirty="0" smtClean="0"/>
+              <a:t> </a:t>
+            </a:r>
+            <a:r>
+              <a:rPr lang="fr-FR" sz="1400" dirty="0" smtClean="0"/>
+              <a:t>pour l’expérience</a:t>
+            </a:r>
+            <a:r>
+              <a:rPr lang="fr-FR" sz="1400" dirty="0"/>
+              <a:t>. Les mots entre parenthèses sont </a:t>
+            </a:r>
+            <a:r>
+              <a:rPr lang="fr-FR" sz="1400" dirty="0" smtClean="0"/>
+              <a:t>ceux qui apparaîtront durant l’expérience</a:t>
+            </a:r>
+            <a:r>
+              <a:rPr lang="fr-FR" sz="1400" dirty="0" smtClean="0"/>
+              <a:t>.</a:t>
+            </a:r>
             <a:endParaRPr lang="fr-FR" sz="1400" dirty="0"/>
           </a:p>
           <a:p>
             <a:pPr algn="ctr"/>
+            <a:endParaRPr lang="fr-FR" sz="1400" dirty="0" smtClean="0"/>
+          </a:p>
+          <a:p>
+            <a:pPr algn="ctr"/>
+            <a:endParaRPr lang="fr-FR" sz="1400" dirty="0"/>
+          </a:p>
+          <a:p>
+            <a:pPr algn="ctr"/>
             <a:r>
               <a:rPr lang="fr-FR" sz="1400" dirty="0" smtClean="0"/>
               <a:t>Certains de ces événements sont réels, d’autres sont fictifs. </a:t>
@@ -3684,24 +3718,25 @@
           </a:p>
           <a:p>
             <a:pPr algn="ctr"/>
-            <a:r>
-              <a:rPr lang="fr-FR" sz="1400" dirty="0" smtClean="0"/>
-              <a:t>Les mots entre parenthèses sont là pour vous aider à mieux mémoriser les événements.</a:t>
-            </a:r>
-          </a:p>
-          <a:p>
-            <a:pPr algn="ctr"/>
             <a:endParaRPr lang="fr-FR" sz="1400" dirty="0"/>
           </a:p>
           <a:p>
             <a:pPr algn="ctr"/>
             <a:r>
               <a:rPr lang="fr-FR" sz="1400" dirty="0" smtClean="0"/>
-              <a:t>Vous serez testés sur les dates (pas sur </a:t>
+              <a:t>Votre connaissance de ces </a:t>
+            </a:r>
+            <a:r>
+              <a:rPr lang="fr-FR" sz="1400" dirty="0" smtClean="0"/>
+              <a:t>dates </a:t>
+            </a:r>
+            <a:r>
+              <a:rPr lang="fr-FR" sz="1400" dirty="0" smtClean="0"/>
+              <a:t>est fondamentale pour le bon déroulement </a:t>
             </a:r>
             <a:r>
               <a:rPr lang="fr-FR" sz="1400" smtClean="0"/>
-              <a:t>la fonctionnalité). </a:t>
+              <a:t>de l’expérience. </a:t>
             </a:r>
             <a:r>
               <a:rPr lang="fr-FR" sz="1400" dirty="0" smtClean="0"/>
@@ -4379,7 +4414,7 @@
             <a:pPr algn="ctr"/>
             <a:r>
               <a:rPr lang="fr-FR" sz="1400" dirty="0" smtClean="0"/>
-              <a:t>Hiver 2019</a:t>
+              <a:t>Début 2019</a:t>
             </a:r>
           </a:p>
           <a:p>

</xml_diff>

<commit_message>
wrote procedure, participants mail, participants info, questionnaire : added error loops and score
</commit_message>
<xml_diff>
--- a/documents/participant_event_list1.pptx
+++ b/documents/participant_event_list1.pptx
@@ -244,7 +244,7 @@
           <a:p>
             <a:fld id="{9FFE242A-08A2-4053-89B2-268DFB2B411B}" type="datetimeFigureOut">
               <a:rPr lang="fr-FR" smtClean="0"/>
-              <a:t>17/04/2019</a:t>
+              <a:t>24/04/2019</a:t>
             </a:fld>
             <a:endParaRPr lang="fr-FR"/>
           </a:p>
@@ -414,7 +414,7 @@
           <a:p>
             <a:fld id="{9FFE242A-08A2-4053-89B2-268DFB2B411B}" type="datetimeFigureOut">
               <a:rPr lang="fr-FR" smtClean="0"/>
-              <a:t>17/04/2019</a:t>
+              <a:t>24/04/2019</a:t>
             </a:fld>
             <a:endParaRPr lang="fr-FR"/>
           </a:p>
@@ -594,7 +594,7 @@
           <a:p>
             <a:fld id="{9FFE242A-08A2-4053-89B2-268DFB2B411B}" type="datetimeFigureOut">
               <a:rPr lang="fr-FR" smtClean="0"/>
-              <a:t>17/04/2019</a:t>
+              <a:t>24/04/2019</a:t>
             </a:fld>
             <a:endParaRPr lang="fr-FR"/>
           </a:p>
@@ -764,7 +764,7 @@
           <a:p>
             <a:fld id="{9FFE242A-08A2-4053-89B2-268DFB2B411B}" type="datetimeFigureOut">
               <a:rPr lang="fr-FR" smtClean="0"/>
-              <a:t>17/04/2019</a:t>
+              <a:t>24/04/2019</a:t>
             </a:fld>
             <a:endParaRPr lang="fr-FR"/>
           </a:p>
@@ -1010,7 +1010,7 @@
           <a:p>
             <a:fld id="{9FFE242A-08A2-4053-89B2-268DFB2B411B}" type="datetimeFigureOut">
               <a:rPr lang="fr-FR" smtClean="0"/>
-              <a:t>17/04/2019</a:t>
+              <a:t>24/04/2019</a:t>
             </a:fld>
             <a:endParaRPr lang="fr-FR"/>
           </a:p>
@@ -1242,7 +1242,7 @@
           <a:p>
             <a:fld id="{9FFE242A-08A2-4053-89B2-268DFB2B411B}" type="datetimeFigureOut">
               <a:rPr lang="fr-FR" smtClean="0"/>
-              <a:t>17/04/2019</a:t>
+              <a:t>24/04/2019</a:t>
             </a:fld>
             <a:endParaRPr lang="fr-FR"/>
           </a:p>
@@ -1609,7 +1609,7 @@
           <a:p>
             <a:fld id="{9FFE242A-08A2-4053-89B2-268DFB2B411B}" type="datetimeFigureOut">
               <a:rPr lang="fr-FR" smtClean="0"/>
-              <a:t>17/04/2019</a:t>
+              <a:t>24/04/2019</a:t>
             </a:fld>
             <a:endParaRPr lang="fr-FR"/>
           </a:p>
@@ -1727,7 +1727,7 @@
           <a:p>
             <a:fld id="{9FFE242A-08A2-4053-89B2-268DFB2B411B}" type="datetimeFigureOut">
               <a:rPr lang="fr-FR" smtClean="0"/>
-              <a:t>17/04/2019</a:t>
+              <a:t>24/04/2019</a:t>
             </a:fld>
             <a:endParaRPr lang="fr-FR"/>
           </a:p>
@@ -1822,7 +1822,7 @@
           <a:p>
             <a:fld id="{9FFE242A-08A2-4053-89B2-268DFB2B411B}" type="datetimeFigureOut">
               <a:rPr lang="fr-FR" smtClean="0"/>
-              <a:t>17/04/2019</a:t>
+              <a:t>24/04/2019</a:t>
             </a:fld>
             <a:endParaRPr lang="fr-FR"/>
           </a:p>
@@ -2099,7 +2099,7 @@
           <a:p>
             <a:fld id="{9FFE242A-08A2-4053-89B2-268DFB2B411B}" type="datetimeFigureOut">
               <a:rPr lang="fr-FR" smtClean="0"/>
-              <a:t>17/04/2019</a:t>
+              <a:t>24/04/2019</a:t>
             </a:fld>
             <a:endParaRPr lang="fr-FR"/>
           </a:p>
@@ -2352,7 +2352,7 @@
           <a:p>
             <a:fld id="{9FFE242A-08A2-4053-89B2-268DFB2B411B}" type="datetimeFigureOut">
               <a:rPr lang="fr-FR" smtClean="0"/>
-              <a:t>17/04/2019</a:t>
+              <a:t>24/04/2019</a:t>
             </a:fld>
             <a:endParaRPr lang="fr-FR"/>
           </a:p>
@@ -2565,7 +2565,7 @@
           <a:p>
             <a:fld id="{9FFE242A-08A2-4053-89B2-268DFB2B411B}" type="datetimeFigureOut">
               <a:rPr lang="fr-FR" smtClean="0"/>
-              <a:t>17/04/2019</a:t>
+              <a:t>24/04/2019</a:t>
             </a:fld>
             <a:endParaRPr lang="fr-FR"/>
           </a:p>
@@ -3303,7 +3303,7 @@
         </p:nvSpPr>
         <p:spPr>
           <a:xfrm>
-            <a:off x="9452775" y="5396094"/>
+            <a:off x="9452774" y="5396094"/>
             <a:ext cx="2332761" cy="1236995"/>
           </a:xfrm>
           <a:prstGeom prst="rect">
@@ -3433,7 +3433,7 @@
         </p:nvSpPr>
         <p:spPr>
           <a:xfrm>
-            <a:off x="9452776" y="3706439"/>
+            <a:off x="9452774" y="3701898"/>
             <a:ext cx="2332761" cy="1236995"/>
           </a:xfrm>
           <a:prstGeom prst="rect">
@@ -3498,7 +3498,7 @@
         </p:nvSpPr>
         <p:spPr>
           <a:xfrm>
-            <a:off x="9452777" y="2124606"/>
+            <a:off x="9452774" y="2007702"/>
             <a:ext cx="2332761" cy="1236995"/>
           </a:xfrm>
           <a:prstGeom prst="rect">
@@ -3629,7 +3629,7 @@
         <p:spPr>
           <a:xfrm>
             <a:off x="330924" y="311426"/>
-            <a:ext cx="8413997" cy="3050175"/>
+            <a:ext cx="8413997" cy="2933271"/>
           </a:xfrm>
           <a:prstGeom prst="rect">
             <a:avLst/>
@@ -3657,58 +3657,33 @@
           <a:p>
             <a:pPr algn="ctr"/>
             <a:r>
-              <a:rPr lang="fr-FR" dirty="0" smtClean="0"/>
+              <a:rPr lang="fr-FR" dirty="0"/>
               <a:t>Merci de participer à l’expérience!</a:t>
             </a:r>
           </a:p>
           <a:p>
             <a:pPr algn="ctr"/>
-            <a:endParaRPr lang="fr-FR" dirty="0"/>
-          </a:p>
-          <a:p>
-            <a:pPr algn="ctr"/>
-            <a:r>
-              <a:rPr lang="fr-FR" sz="1400" dirty="0" smtClean="0"/>
-              <a:t>Vous trouverez ici la liste des événements à </a:t>
-            </a:r>
-            <a:r>
-              <a:rPr lang="fr-FR" sz="1400" dirty="0" smtClean="0"/>
-              <a:t>étudier</a:t>
-            </a:r>
-            <a:r>
-              <a:rPr lang="fr-FR" sz="1400" dirty="0" smtClean="0"/>
-              <a:t> </a:t>
-            </a:r>
-            <a:r>
-              <a:rPr lang="fr-FR" sz="1400" dirty="0" smtClean="0"/>
-              <a:t>pour l’expérience</a:t>
-            </a:r>
+            <a:endParaRPr lang="fr-FR" sz="1400" dirty="0"/>
+          </a:p>
+          <a:p>
+            <a:pPr algn="ctr"/>
             <a:r>
               <a:rPr lang="fr-FR" sz="1400" dirty="0"/>
-              <a:t>. Les mots entre parenthèses sont </a:t>
-            </a:r>
-            <a:r>
-              <a:rPr lang="fr-FR" sz="1400" dirty="0" smtClean="0"/>
-              <a:t>ceux qui apparaîtront durant l’expérience</a:t>
-            </a:r>
-            <a:r>
-              <a:rPr lang="fr-FR" sz="1400" dirty="0" smtClean="0"/>
-              <a:t>.</a:t>
-            </a:r>
+              <a:t>Vous trouverez ici la liste des événements dont nous vous invitons à prendre connaissance pour l’expérience. Les mots entre guillemets sont ceux qui apparaîtront durant l’expérience.</a:t>
+            </a:r>
+          </a:p>
+          <a:p>
+            <a:pPr algn="ctr"/>
             <a:endParaRPr lang="fr-FR" sz="1400" dirty="0"/>
           </a:p>
           <a:p>
             <a:pPr algn="ctr"/>
-            <a:endParaRPr lang="fr-FR" sz="1400" dirty="0" smtClean="0"/>
-          </a:p>
-          <a:p>
-            <a:pPr algn="ctr"/>
             <a:endParaRPr lang="fr-FR" sz="1400" dirty="0"/>
           </a:p>
           <a:p>
             <a:pPr algn="ctr"/>
             <a:r>
-              <a:rPr lang="fr-FR" sz="1400" dirty="0" smtClean="0"/>
+              <a:rPr lang="fr-FR" sz="1400" dirty="0"/>
               <a:t>Certains de ces événements sont réels, d’autres sont fictifs. </a:t>
             </a:r>
           </a:p>
@@ -3723,26 +3698,9 @@
           <a:p>
             <a:pPr algn="ctr"/>
             <a:r>
-              <a:rPr lang="fr-FR" sz="1400" dirty="0" smtClean="0"/>
-              <a:t>Votre connaissance de ces </a:t>
-            </a:r>
-            <a:r>
-              <a:rPr lang="fr-FR" sz="1400" dirty="0" smtClean="0"/>
-              <a:t>dates </a:t>
-            </a:r>
-            <a:r>
-              <a:rPr lang="fr-FR" sz="1400" dirty="0" smtClean="0"/>
-              <a:t>est fondamentale pour le bon déroulement </a:t>
-            </a:r>
-            <a:r>
-              <a:rPr lang="fr-FR" sz="1400" smtClean="0"/>
-              <a:t>de l’expérience. </a:t>
-            </a:r>
-            <a:r>
-              <a:rPr lang="fr-FR" sz="1400" dirty="0" smtClean="0"/>
-              <a:t>Bon courage!</a:t>
-            </a:r>
-            <a:endParaRPr lang="fr-FR" sz="1400" dirty="0"/>
+              <a:rPr lang="fr-FR" sz="1400" dirty="0"/>
+              <a:t>Votre connaissance de ces événements et de leurs dates est fondamentale pour le bon déroulement de l’expérience. Bon courage!</a:t>
+            </a:r>
           </a:p>
         </p:txBody>
       </p:sp>
@@ -3791,7 +3749,7 @@
         </p:nvSpPr>
         <p:spPr>
           <a:xfrm>
-            <a:off x="330926" y="313509"/>
+            <a:off x="330926" y="316661"/>
             <a:ext cx="2332761" cy="1236995"/>
           </a:xfrm>
           <a:prstGeom prst="rect">
@@ -4254,7 +4212,7 @@
         </p:nvSpPr>
         <p:spPr>
           <a:xfrm>
-            <a:off x="3371543" y="313509"/>
+            <a:off x="3371540" y="313509"/>
             <a:ext cx="2332761" cy="1236995"/>
           </a:xfrm>
           <a:prstGeom prst="rect">
@@ -4291,7 +4249,7 @@
             <a:pPr algn="ctr"/>
             <a:r>
               <a:rPr lang="fr-FR" sz="1400" dirty="0" smtClean="0"/>
-              <a:t>« Paris Express »</a:t>
+              <a:t>« Grand Paris »</a:t>
             </a:r>
           </a:p>
           <a:p>
@@ -4514,7 +4472,7 @@
         </p:nvSpPr>
         <p:spPr>
           <a:xfrm>
-            <a:off x="9452776" y="3706439"/>
+            <a:off x="9452774" y="3701898"/>
             <a:ext cx="2332761" cy="1236995"/>
           </a:xfrm>
           <a:prstGeom prst="rect">
@@ -4644,7 +4602,7 @@
         </p:nvSpPr>
         <p:spPr>
           <a:xfrm>
-            <a:off x="9452777" y="2124606"/>
+            <a:off x="9452774" y="2016784"/>
             <a:ext cx="2332761" cy="1236995"/>
           </a:xfrm>
           <a:prstGeom prst="rect">
@@ -4709,7 +4667,7 @@
         </p:nvSpPr>
         <p:spPr>
           <a:xfrm>
-            <a:off x="6412160" y="311427"/>
+            <a:off x="6412160" y="316661"/>
             <a:ext cx="2332761" cy="1236995"/>
           </a:xfrm>
           <a:prstGeom prst="rect">
@@ -4774,7 +4732,7 @@
         </p:nvSpPr>
         <p:spPr>
           <a:xfrm>
-            <a:off x="9452777" y="311426"/>
+            <a:off x="9452774" y="327129"/>
             <a:ext cx="2332761" cy="1236995"/>
           </a:xfrm>
           <a:prstGeom prst="rect">

</xml_diff>